<commit_message>
refreshing live embedded data
</commit_message>
<xml_diff>
--- a/Marley international Sales Report 2015.pptx
+++ b/Marley international Sales Report 2015.pptx
@@ -201,7 +201,7 @@
           <a:p>
             <a:fld id="{3A66E791-6C14-4B19-B242-DE693D0DCDD0}" type="datetimeFigureOut">
               <a:rPr lang="en-US" smtClean="0"/>
-              <a:t>10/17/2024</a:t>
+              <a:t>11/12/2024</a:t>
             </a:fld>
             <a:endParaRPr lang="en-US"/>
           </a:p>
@@ -699,7 +699,7 @@
           <a:p>
             <a:fld id="{44AC4CF2-08F4-40D7-A422-908271C2DD19}" type="datetimeFigureOut">
               <a:rPr lang="en-US" smtClean="0"/>
-              <a:t>10/17/2024</a:t>
+              <a:t>11/12/2024</a:t>
             </a:fld>
             <a:endParaRPr lang="en-US"/>
           </a:p>
@@ -897,7 +897,7 @@
           <a:p>
             <a:fld id="{44AC4CF2-08F4-40D7-A422-908271C2DD19}" type="datetimeFigureOut">
               <a:rPr lang="en-US" smtClean="0"/>
-              <a:t>10/17/2024</a:t>
+              <a:t>11/12/2024</a:t>
             </a:fld>
             <a:endParaRPr lang="en-US"/>
           </a:p>
@@ -1105,7 +1105,7 @@
           <a:p>
             <a:fld id="{44AC4CF2-08F4-40D7-A422-908271C2DD19}" type="datetimeFigureOut">
               <a:rPr lang="en-US" smtClean="0"/>
-              <a:t>10/17/2024</a:t>
+              <a:t>11/12/2024</a:t>
             </a:fld>
             <a:endParaRPr lang="en-US"/>
           </a:p>
@@ -1303,7 +1303,7 @@
           <a:p>
             <a:fld id="{44AC4CF2-08F4-40D7-A422-908271C2DD19}" type="datetimeFigureOut">
               <a:rPr lang="en-US" smtClean="0"/>
-              <a:t>10/17/2024</a:t>
+              <a:t>11/12/2024</a:t>
             </a:fld>
             <a:endParaRPr lang="en-US"/>
           </a:p>
@@ -1578,7 +1578,7 @@
           <a:p>
             <a:fld id="{44AC4CF2-08F4-40D7-A422-908271C2DD19}" type="datetimeFigureOut">
               <a:rPr lang="en-US" smtClean="0"/>
-              <a:t>10/17/2024</a:t>
+              <a:t>11/12/2024</a:t>
             </a:fld>
             <a:endParaRPr lang="en-US"/>
           </a:p>
@@ -1843,7 +1843,7 @@
           <a:p>
             <a:fld id="{44AC4CF2-08F4-40D7-A422-908271C2DD19}" type="datetimeFigureOut">
               <a:rPr lang="en-US" smtClean="0"/>
-              <a:t>10/17/2024</a:t>
+              <a:t>11/12/2024</a:t>
             </a:fld>
             <a:endParaRPr lang="en-US"/>
           </a:p>
@@ -2255,7 +2255,7 @@
           <a:p>
             <a:fld id="{44AC4CF2-08F4-40D7-A422-908271C2DD19}" type="datetimeFigureOut">
               <a:rPr lang="en-US" smtClean="0"/>
-              <a:t>10/17/2024</a:t>
+              <a:t>11/12/2024</a:t>
             </a:fld>
             <a:endParaRPr lang="en-US"/>
           </a:p>
@@ -2396,7 +2396,7 @@
           <a:p>
             <a:fld id="{44AC4CF2-08F4-40D7-A422-908271C2DD19}" type="datetimeFigureOut">
               <a:rPr lang="en-US" smtClean="0"/>
-              <a:t>10/17/2024</a:t>
+              <a:t>11/12/2024</a:t>
             </a:fld>
             <a:endParaRPr lang="en-US"/>
           </a:p>
@@ -2509,7 +2509,7 @@
           <a:p>
             <a:fld id="{44AC4CF2-08F4-40D7-A422-908271C2DD19}" type="datetimeFigureOut">
               <a:rPr lang="en-US" smtClean="0"/>
-              <a:t>10/17/2024</a:t>
+              <a:t>11/12/2024</a:t>
             </a:fld>
             <a:endParaRPr lang="en-US"/>
           </a:p>
@@ -2820,7 +2820,7 @@
           <a:p>
             <a:fld id="{44AC4CF2-08F4-40D7-A422-908271C2DD19}" type="datetimeFigureOut">
               <a:rPr lang="en-US" smtClean="0"/>
-              <a:t>10/17/2024</a:t>
+              <a:t>11/12/2024</a:t>
             </a:fld>
             <a:endParaRPr lang="en-US"/>
           </a:p>
@@ -3108,7 +3108,7 @@
           <a:p>
             <a:fld id="{44AC4CF2-08F4-40D7-A422-908271C2DD19}" type="datetimeFigureOut">
               <a:rPr lang="en-US" smtClean="0"/>
-              <a:t>10/17/2024</a:t>
+              <a:t>11/12/2024</a:t>
             </a:fld>
             <a:endParaRPr lang="en-US"/>
           </a:p>
@@ -3349,7 +3349,7 @@
           <a:p>
             <a:fld id="{44AC4CF2-08F4-40D7-A422-908271C2DD19}" type="datetimeFigureOut">
               <a:rPr lang="en-US" smtClean="0"/>
-              <a:t>10/17/2024</a:t>
+              <a:t>11/12/2024</a:t>
             </a:fld>
             <a:endParaRPr lang="en-US"/>
           </a:p>
@@ -5519,7 +5519,7 @@
   <we:properties>
     <we:property name="artifactViewState" value="&quot;live&quot;"/>
     <we:property name="backgroundColor" value="&quot;#FFFFFF&quot;"/>
-    <we:property name="bookmark" value="&quot;H4sIAAAAAAAAA+2Y30/bMBDH/5XKz90UJ23S8AaFaQ9sQ3TiZerDxb6kBjeOHKfQof7vs51QYK0GQyAQVKrU5HsX3w9/Lkl7TbioKwnL7zBHskcOlLqYg77oUdInZauFeZoNUhhAYD+UDiPKE2tVlRGqrMneNTGgCzRnom5AuoWs+IsMB3GYxwnENKZslAyzmMdk2icg5QkUzicHWWOfVKhrVYIUv7FdwpqMbnDVJ3hVSaXBBZoYMOiCLay7PbeJ0c+RzQOYEQucIDOtGo8gpHk2jFKaByNIAp66YurWwee71cUt7cOPVWlAlDaM08JBlLFRRofWPUMajXAYOT0X0nQu2fLoqtK2ZtuJZeVats8XUDLkxJegsW4zvib7RaGxANOdHt0zjpVs5lv0iWo0w1PMvak0wixtjB+au/gr26YTrWwTvToBia34pSm7lgTudKYuxxptD7kT+utUx1YqlBYM5Ea2XwVq0Gy2PMYFys3E1vZN001KZ6BFu3++iCcU15G5Xojcq9c79g4dG875TkbEib1bwZm7Osg3u8UzstmWqVVqURayI/EWip9tt6TlYjwDbdwAZOeWKUfA6oZCm9j5Hc663i49Gu++mdOVUxMeBoxTGkRJkGLA7Xix3by8ky3+73mpxEKZn5BJfNTAnKrL+iMNy9Zn5AcZludI6BQLd9UTwGQ++tZbuXKhDtqb9qHQNy8WYf+vRF+r3avpYx43z9reltYRHcY0RQaM0pBmgyDhgwdpfWkE7CFvmOmti/8Xj29+dHbcvhATLcFpEHMepykCUJpAEEZh8mYInjTZpx3FO4of4KIlmY+4fbXmPMtTFoYY5pDkr06y/43eU7pntYWwiO4w3mG8DQrHsMf4tmdkjrrwb+mqMXUFDE+gRJ9F1S4m0PtZVqDkbof8sXbfx8JC327QGcjG7Y3/c4n4MD7aH1K4T+nqEgAA&quot;"/>
+    <we:property name="bookmark" value="&quot;H4sIAAAAAAAAA+2YTVPbMBCG/0pG57Rj2fEXNwh0eqAtQxgunRzW0toROJZHlgMpk/9eSQ4BmhRoB4aW5JT41Ub77upZj50bwkVTlzD/ClMke+RAysspqMseJX1SdVrmx0FIM86yJEpp6PssBbMqay1k1ZC9G6JBFajPRdNCaTcy4vdxn0BZnkBhr3IoG+yTGlUjKyjFD+yCzZJWLS76BK/rUiqwW440aLTbzky4uTYW6MfAZASmxQxHyHSnRgn4NM/CIKW5l0Ds8dTabroA52xjiN3apR/KSoOoTBqr+YMgY0lGQxOeIQ0SDAOr56LUy5BsfnRdK1OdqXle2+bs8xlUDDlxJShsOsc3ZL8oFBagl5dHDxaHsmynG/SRbBXDU8zdUqWFnpsc3xS3+RemTSdKmiY6dQQlduKntlq2xLOXE3k1VGh6yK3QX1kdGqmQSjAo19x+FqhAscn8GGdYrhtbra8v3Vo6ByW683NF/EVxSwZXG5EH9brA3qFlwwbfc0Ss2LsT7PKyDvLFHPGErLdlbJRGVEW5JPEOirOuW6XhYjgBpS3q2YVhyhKwuKXQGLu4x9myt3OHxrtv5nhhVZ5wngDnWZ4y30c/hzh/cl4eg/BFpsLePHpS9Yw2E2YyN5x9//+Z3icxZc7LRlClTXzQIXko1O1t0+//Yvutal2MnzNMrwVFx3DqRZxHaYoAlMbg+YEfvznD5itvme6N2uzDqhc7jLce499w0ZGc0DCiKTJglPo0G3gxH/wzJO8o3lH8CBMdweEg8vMohohGlCVxmEU82pbn75cwdIqF/dWO29fhdtXejtaY+x7jlHpB7KXomSfhmG0Lre/+BeePJ6gWM6nPICvxWa+Lp/Kq2Z5XRTcvd00hU1SF8ylb3dTA8AQqdO2ou7QCXZyBDipuT8B9V/bzWJjp6g7gHMrW+nZ/LhGXxmX7CaIZ0/nUEgAA&quot;"/>
     <we:property name="creatorSessionId" value="&quot;d6dbd6c1-4f3f-4524-82ce-468bc45fa0db&quot;"/>
     <we:property name="creatorTenantId" value="&quot;3d9c14c6-c3ed-4dae-bb5f-c37cccd3ab49&quot;"/>
     <we:property name="creatorUserId" value="&quot;10032003CBB44361&quot;"/>
@@ -5548,23 +5548,23 @@
     <we:reference id="WA200003233" version="2.0.0.3" store="" storeType="OMEX"/>
   </we:alternateReferences>
   <we:properties>
-    <we:property name="reportUrl" value="&quot;/groups/me/reports/8b7c46f9-cc72-46de-b923-037a03e4f333/88fa9fda4329748fbd3e?bookmarkGuid=b371b513-e5b0-461a-ba7d-6864c180b7a4&amp;bookmarkUsage=1&amp;ctid=3d9c14c6-c3ed-4dae-bb5f-c37cccd3ab49&amp;fromEntryPoint=export&quot;"/>
-    <we:property name="reportName" value="&quot;~$Marley International Store Sales analytics (Recovered 996ea20d5a0148f5bb637a7aa3f9b127)&quot;"/>
-    <we:property name="reportState" value="&quot;CONNECTED&quot;"/>
+    <we:property name="artifactViewState" value="&quot;live&quot;"/>
+    <we:property name="backgroundColor" value="&quot;#FFFFFF&quot;"/>
+    <we:property name="bookmark" value="&quot;H4sIAAAAAAAAA+2XTVPbMBCG/0pGZ7fjD8WxuUGankrLkA6XDoe1tDICx/LIMiVl8t+7kkMLlJYZSqc5JJdYq7X23VePv26Z1H3XwPojrJAdsCNjrlZgryYJi1g7xvJclLMqKadTBEwxB0hnNGs6p03bs4Nb5sDW6M50P0DjF6Lgl/OIQdOcQO1HCpoeI9ah7U0Ljf6GYzJNOTvgJmJ40zXGgl9y6cChX/aa0mlMEpK3GVUE4fQ1LlG4MVoUCkolgWdpOeOFqmSGlNaPCUHZkyl+6VB+bloHuqUyPpbOEo5VhhLTHDCeVUJmPq5047Yp1Xpx01nqjnped96cQ3kNrUDJQgsW+1HxLTtG6Acbii0eTCzNYAWeogpTrdNuTet8stLX2JAVJ9aQUSF6SBaQgxMKKe0mx+SzbkPShfk6t0hGSXYQb84p0uu2bra+/mzx8yhTgPUSTXVJ5vhW6ATjSx6tQzfvtL2zNY0eCf6nnZB0SuQJB8l5Bjyp0jQVyUyWz1o/p+5rY7Wgfh+7PzfNsGr/TvIp1v6sX92Ont/9w7q2WIPbDhevLm70MUTfD+126+KXkBHEzC/AupcC8t+a3Zzf3RQo4/LeZb9FY5T+qiwQrp5XTIVQWc7jrAA+RY5l9d95nQ+9Myu0kyXWK2zdntw9uU9SsWVY5ZUs87ICCYCSHvE7cM+lQzkIN1kO1ZsfVuw53nP8OzJGljORyErwAqbTgnMR50qlO8PynuM9x3+kYmS4qBLFs2mc0guFKhOpijJ++efHzmAT7dL19izDDqoGFzcP+Q2/+xFGz9M6fBCZwfUdCDyBFsO+dKMejSGPmoRW+trh2Pr/D5q2cyx9Bs3gq4bPYxbKeBY23wEVRxrtlg8AAA==&quot;"/>
+    <we:property name="creatorSessionId" value="&quot;ce4c724a-e035-4bd1-9637-383196f999cc&quot;"/>
+    <we:property name="creatorTenantId" value="&quot;3d9c14c6-c3ed-4dae-bb5f-c37cccd3ab49&quot;"/>
+    <we:property name="creatorUserId" value="&quot;10032003CBB44361&quot;"/>
+    <we:property name="datasetId" value="&quot;8caa287d-2856-4279-b7e6-4eec2e32df16&quot;"/>
     <we:property name="embedUrl" value="&quot;/reportEmbed?reportId=8b7c46f9-cc72-46de-b923-037a03e4f333&amp;config=eyJjbHVzdGVyVXJsIjoiaHR0cHM6Ly9XQUJJLVdFU1QtRVVST1BFLUItUFJJTUFSWS1yZWRpcmVjdC5hbmFseXNpcy53aW5kb3dzLm5ldCIsImVtYmVkRmVhdHVyZXMiOnsidXNhZ2VNZXRyaWNzVk5leHQiOnRydWV9fQ%3D%3D&amp;disableSensitivityBanner=true&quot;"/>
-    <we:property name="pageName" value="&quot;88fa9fda4329748fbd3e&quot;"/>
-    <we:property name="pageDisplayName" value="&quot;Profit&quot;"/>
-    <we:property name="datasetId" value="&quot;8caa287d-2856-4279-b7e6-4eec2e32df16&quot;"/>
-    <we:property name="backgroundColor" value="&quot;#FFFFFF&quot;"/>
-    <we:property name="bookmark" value="&quot;H4sIAAAAAAAAA+1XTU/bQBD9K9Ge3cofm9jmBik9lRaRigvKYbw7axYc21qvKSnKf+/s2kApkSLRIqiUUzyzk5k3b57XmjsmdddWsP4KK2QH7KhprldgricRC1g9+EQaJcjVdDpLuQxlHoW5oNOmtbqpO3ZwxyyYEu257nqoXCJyXiwDBlV1CqWzFFQdBqxF0zU1VPonDsF0ZE2Pm4DhbVs1BlzKhQWLLu0NhZNNEKKPCVUEYfUNLlDYwZtlCnIlgSdxnvJMFTJBCuuGAI9sa4hL7cvPm9qCrqmMjy0ixZNpGAOfqjySKstD51e6smNIsT6+bQ11Rz2vW0fOobyBWqBkvgWD3YD4jh2WpcES7GgePzmcN1W/2uJfNL0ReIbKH9VW2zXV+Gakq78hmk5NQyR6Lz0qbb33c1+PnITOvGx+zA0SidI5ggesc3KVjdECqmdw/xEi2Qs7Geus2XMwS/J0ui6rUQCPs/g+YLRQVHh86/RVXNEgHe0blycRkSwEz2A6zTgX4UypeOd03kHHwX8klZ3TER7M/BKMfTohMlzlo7Vn/5M29y9pHPyB+82a3SzvbxCKuPrtjngYnoP+SqpYeg1zNStkPssLkAAo85Ssd6PhRV982Ot4r+Odyhi1jLEQKpnxMMnog4kc8+LNtTzvO9us0EwWWK6wtnsd73W8VRWjhiMOkvMEeFTEcSyi9B3cx2dYun/tlbtX7qMWBr3GacSxSFBiPAMM00LI5OUbyglC1xv8O4SHtKTRjjcZuJqc0Caot4l3tyDAyJcq4VU78dy72EdojC6T0pdretu1IPAUavQw2yGhRh9HhEMtHQP+2bjfL5pmNRBwDlXvevfrMfNlfLFffNbOzpYPAAA=&quot;"/>
     <we:property name="initialStateBookmark" value="&quot;H4sIAAAAAAAAA+1XTW/bMAz9K4HO3hDbyod7S7Ps0qUtmqGXIRhoiXLVOrYhy12zIv99lOw26xogQLeiHZBTTIomHx9fZPCeSV1XOaxPYYXsiB2X5c0KzE0vZAErOt/Z2cl8cnHy/XQyn5G7rKwui5od3TMLJkN7qesGcpeBnN+WAYM8P4fMWQryGgNWoanLAnL9E9tgOrKmwU3A8K7KSwMu5cKCRZf2lsLJptrhx5gqgrD6FhcobOsdjxUkSgKPo2TExyqVMVJY3QZ4ZDtDXGpffloWFnRBZXxsGioeD/oR8IFKQqnGSd/5lc5tF5KuZ3eVoe6o53XlWJnIWygESuZbMFi3iO/ZJMsMZmA7c/bkcFrmzWqHf1E2RuAFKn9UWG3XVOPMSFd/QzSdm5JI9F56VNp67+em6DjpO/Oq/DE1SCRK5wgesU7JlZVGC8ifwf1HiGQjbK+rs2bPwSzJU+siyzsBbGfxtcVoIc1xduf0lV7TIB3tG5cnFqFMBR/DYDDmXPSHSkV7p/MOOg7+I6nsnY7wYKZXYOzTCZHhKh+vPfuftHn4k0bBH7jfrNnN8uEGoYjr3+6Ix+E56K+kiqXXMFfDVCbDJAUJgDIZkfVuNLxo0g8HHR90vFcZnZYxEkLFQ96Px/TBRI5J+uZanja1LVdoegvMVljYg44POt6pik7DIQfJeQw8TKMoEuHoHdzHF5i5tw7KPSh3q4VWr9Eo5JjGKDEaAvZHqZDxyzeUOULdGPw7hBNa0mjH67Vc9ea0Cepd4t0vCDDypUp41U489y52C43RZZL5cmVj6woEnkOBHmbVJtTo44hwKKRjwD8b9/tF06xaAi4hb1zvfj1mvghxomkD2vOCW5qZh+XB/QJrBRG2vw8AAA==&quot;"/>
     <we:property name="isFiltersActionButtonVisible" value="true"/>
     <we:property name="isVisualContainerHeaderHidden" value="false"/>
+    <we:property name="pageDisplayName" value="&quot;Profit&quot;"/>
+    <we:property name="pageName" value="&quot;88fa9fda4329748fbd3e&quot;"/>
     <we:property name="reportEmbeddedTime" value="&quot;2024-10-17T08:58:55.548Z&quot;"/>
-    <we:property name="creatorTenantId" value="&quot;3d9c14c6-c3ed-4dae-bb5f-c37cccd3ab49&quot;"/>
-    <we:property name="creatorUserId" value="&quot;10032003CBB44361&quot;"/>
-    <we:property name="creatorSessionId" value="&quot;ce4c724a-e035-4bd1-9637-383196f999cc&quot;"/>
-    <we:property name="artifactViewState" value="&quot;live&quot;"/>
+    <we:property name="reportName" value="&quot;~$Marley International Store Sales analytics (Recovered 996ea20d5a0148f5bb637a7aa3f9b127)&quot;"/>
+    <we:property name="reportState" value="&quot;CONNECTED&quot;"/>
+    <we:property name="reportUrl" value="&quot;/groups/me/reports/8b7c46f9-cc72-46de-b923-037a03e4f333/88fa9fda4329748fbd3e?bookmarkGuid=b371b513-e5b0-461a-ba7d-6864c180b7a4&amp;bookmarkUsage=1&amp;ctid=3d9c14c6-c3ed-4dae-bb5f-c37cccd3ab49&amp;fromEntryPoint=export&quot;"/>
   </we:properties>
   <we:bindings/>
   <we:snapshot xmlns:r="http://schemas.openxmlformats.org/officeDocument/2006/relationships"/>

</xml_diff>